<commit_message>
Updating diagram to match resolutions
</commit_message>
<xml_diff>
--- a/specs/src/main/html/qb-fig1-proposed.pptx
+++ b/specs/src/main/html/qb-fig1-proposed.pptx
@@ -3206,7 +3206,7 @@
         <p:spPr>
           <a:xfrm>
             <a:off x="6143636" y="5357826"/>
-            <a:ext cx="1357322" cy="284400"/>
+            <a:ext cx="2143140" cy="284400"/>
           </a:xfrm>
           <a:prstGeom prst="rect">
             <a:avLst/>
@@ -3218,7 +3218,7 @@
             <a:solidFill>
               <a:srgbClr val="000000"/>
             </a:solidFill>
-            <a:prstDash val="dash"/>
+            <a:prstDash val="solid"/>
             <a:round/>
           </a:ln>
           <a:effectLst>
@@ -3241,7 +3241,7 @@
                 </a:solidFill>
                 <a:latin typeface="Calibri"/>
               </a:rPr>
-              <a:t>qb:Hierarchy</a:t>
+              <a:t>qb:HierarchicalCodeList</a:t>
             </a:r>
             <a:endParaRPr lang="en-GB" sz="1600" noProof="1"/>
           </a:p>
@@ -3294,8 +3294,8 @@
         </p:nvSpPr>
         <p:spPr>
           <a:xfrm>
-            <a:off x="7715272" y="5232456"/>
-            <a:ext cx="1479892" cy="553998"/>
+            <a:off x="7528164" y="5786454"/>
+            <a:ext cx="1258678" cy="400110"/>
           </a:xfrm>
           <a:prstGeom prst="rect">
             <a:avLst/>
@@ -3318,14 +3318,9 @@
           <a:p>
             <a:r>
               <a:rPr lang="en-GB" sz="1000" noProof="1" smtClean="0"/>
-              <a:t>qb:narrowingProperty</a:t>
-            </a:r>
-          </a:p>
-          <a:p>
-            <a:r>
-              <a:rPr lang="en-GB" sz="1000" noProof="1" smtClean="0"/>
-              <a:t>qb:broadeningProperty</a:t>
-            </a:r>
+              <a:t>qb:parentChildProperty</a:t>
+            </a:r>
+            <a:endParaRPr lang="en-GB" sz="1000" noProof="1" smtClean="0"/>
           </a:p>
         </p:txBody>
       </p:sp>
@@ -3333,20 +3328,18 @@
         <p:nvCxnSpPr>
           <p:cNvPr id="103" name="Elbow Connector 102"/>
           <p:cNvCxnSpPr>
-            <a:stCxn id="89" idx="3"/>
+            <a:stCxn id="89" idx="2"/>
             <a:endCxn id="100" idx="1"/>
           </p:cNvCxnSpPr>
           <p:nvPr/>
         </p:nvCxnSpPr>
         <p:spPr>
-          <a:xfrm>
-            <a:off x="7500958" y="5500026"/>
-            <a:ext cx="214314" cy="9429"/>
-          </a:xfrm>
-          <a:prstGeom prst="bentConnector3">
-            <a:avLst>
-              <a:gd name="adj1" fmla="val 50000"/>
-            </a:avLst>
+          <a:xfrm rot="16200000" flipH="1">
+            <a:off x="7199544" y="5657888"/>
+            <a:ext cx="344283" cy="312958"/>
+          </a:xfrm>
+          <a:prstGeom prst="bentConnector2">
+            <a:avLst/>
           </a:prstGeom>
           <a:ln>
             <a:solidFill>
@@ -3354,145 +3347,6 @@
             </a:solidFill>
             <a:headEnd type="none" w="med" len="med"/>
             <a:tailEnd type="none" w="med" len="med"/>
-          </a:ln>
-        </p:spPr>
-        <p:style>
-          <a:lnRef idx="1">
-            <a:schemeClr val="accent1"/>
-          </a:lnRef>
-          <a:fillRef idx="0">
-            <a:schemeClr val="accent1"/>
-          </a:fillRef>
-          <a:effectRef idx="0">
-            <a:schemeClr val="accent1"/>
-          </a:effectRef>
-          <a:fontRef idx="minor">
-            <a:schemeClr val="tx1"/>
-          </a:fontRef>
-        </p:style>
-      </p:cxnSp>
-      <p:sp>
-        <p:nvSpPr>
-          <p:cNvPr id="107" name="Isosceles Triangle 106"/>
-          <p:cNvSpPr/>
-          <p:nvPr/>
-        </p:nvSpPr>
-        <p:spPr>
-          <a:xfrm>
-            <a:off x="6715140" y="5643578"/>
-            <a:ext cx="214314" cy="142876"/>
-          </a:xfrm>
-          <a:prstGeom prst="triangle">
-            <a:avLst/>
-          </a:prstGeom>
-          <a:solidFill>
-            <a:schemeClr val="bg1"/>
-          </a:solidFill>
-          <a:ln w="12700">
-            <a:solidFill>
-              <a:schemeClr val="tx1"/>
-            </a:solidFill>
-          </a:ln>
-        </p:spPr>
-        <p:style>
-          <a:lnRef idx="2">
-            <a:schemeClr val="accent1">
-              <a:shade val="50000"/>
-            </a:schemeClr>
-          </a:lnRef>
-          <a:fillRef idx="1">
-            <a:schemeClr val="accent1"/>
-          </a:fillRef>
-          <a:effectRef idx="0">
-            <a:schemeClr val="accent1"/>
-          </a:effectRef>
-          <a:fontRef idx="minor">
-            <a:schemeClr val="lt1"/>
-          </a:fontRef>
-        </p:style>
-        <p:txBody>
-          <a:bodyPr rtlCol="0" anchor="ctr"/>
-          <a:lstStyle/>
-          <a:p>
-            <a:pPr algn="ctr"/>
-            <a:endParaRPr lang="en-GB" noProof="1"/>
-          </a:p>
-        </p:txBody>
-      </p:sp>
-      <p:sp>
-        <p:nvSpPr>
-          <p:cNvPr id="108" name="CustomShape 1"/>
-          <p:cNvSpPr/>
-          <p:nvPr/>
-        </p:nvSpPr>
-        <p:spPr>
-          <a:xfrm>
-            <a:off x="5715008" y="5930682"/>
-            <a:ext cx="2214578" cy="284400"/>
-          </a:xfrm>
-          <a:prstGeom prst="rect">
-            <a:avLst/>
-          </a:prstGeom>
-          <a:solidFill>
-            <a:srgbClr val="FFFFFF"/>
-          </a:solidFill>
-          <a:ln w="12600">
-            <a:solidFill>
-              <a:srgbClr val="000000"/>
-            </a:solidFill>
-            <a:prstDash val="dash"/>
-            <a:round/>
-          </a:ln>
-          <a:effectLst>
-            <a:outerShdw blurRad="50800" dist="38100" dir="2700000" algn="tl" rotWithShape="0">
-              <a:prstClr val="black">
-                <a:alpha val="40000"/>
-              </a:prstClr>
-            </a:outerShdw>
-          </a:effectLst>
-        </p:spPr>
-        <p:txBody>
-          <a:bodyPr lIns="90000" tIns="45000" rIns="90000" bIns="45000" anchor="ctr"/>
-          <a:lstStyle/>
-          <a:p>
-            <a:pPr algn="ctr"/>
-            <a:r>
-              <a:rPr lang="en-GB" sz="1400" noProof="1" smtClean="0">
-                <a:solidFill>
-                  <a:srgbClr val="000000"/>
-                </a:solidFill>
-                <a:latin typeface="Calibri"/>
-              </a:rPr>
-              <a:t>qb:AggregatableHierarchy</a:t>
-            </a:r>
-            <a:endParaRPr lang="en-GB" sz="1600" noProof="1"/>
-          </a:p>
-        </p:txBody>
-      </p:sp>
-      <p:cxnSp>
-        <p:nvCxnSpPr>
-          <p:cNvPr id="109" name="Elbow Connector 42"/>
-          <p:cNvCxnSpPr>
-            <a:stCxn id="108" idx="0"/>
-            <a:endCxn id="107" idx="3"/>
-          </p:cNvCxnSpPr>
-          <p:nvPr/>
-        </p:nvCxnSpPr>
-        <p:spPr>
-          <a:xfrm rot="5400000" flipH="1" flipV="1">
-            <a:off x="6750183" y="5858568"/>
-            <a:ext cx="144228" cy="1588"/>
-          </a:xfrm>
-          <a:prstGeom prst="bentConnector3">
-            <a:avLst>
-              <a:gd name="adj1" fmla="val 50000"/>
-            </a:avLst>
-          </a:prstGeom>
-          <a:ln>
-            <a:solidFill>
-              <a:schemeClr val="tx1"/>
-            </a:solidFill>
-            <a:tailEnd type="none"/>
           </a:ln>
         </p:spPr>
         <p:style>

</xml_diff>